<commit_message>
fixed formatting errors in slides
</commit_message>
<xml_diff>
--- a/Slides/Module 05 Interaction-Level Design Patterns.pptx
+++ b/Slides/Module 05 Interaction-Level Design Patterns.pptx
@@ -230,7 +230,18 @@
       </p14:sectionLst>
     </p:ext>
     <p:ext uri="{EFAFB233-063F-42B5-8137-9DF3F51BA10A}">
-      <p15:sldGuideLst xmlns:p15="http://schemas.microsoft.com/office/powerpoint/2012/main"/>
+      <p15:sldGuideLst xmlns:p15="http://schemas.microsoft.com/office/powerpoint/2012/main">
+        <p15:guide id="1" orient="horz" pos="1512" userDrawn="1">
+          <p15:clr>
+            <a:srgbClr val="A4A3A4"/>
+          </p15:clr>
+        </p15:guide>
+        <p15:guide id="2" pos="3840" userDrawn="1">
+          <p15:clr>
+            <a:srgbClr val="A4A3A4"/>
+          </p15:clr>
+        </p15:guide>
+      </p15:sldGuideLst>
     </p:ext>
   </p:extLst>
 </p:presentation>
@@ -5000,7 +5011,7 @@
           <a:p>
             <a:fld id="{7C7E5181-6CF5-45F7-A87A-E0E0B1FD7549}" type="datetimeFigureOut">
               <a:rPr lang="en-US" smtClean="0"/>
-              <a:t>9/8/2024</a:t>
+              <a:t>9/16/2024</a:t>
             </a:fld>
             <a:endParaRPr lang="en-US"/>
           </a:p>
@@ -9858,7 +9869,7 @@
           <a:p>
             <a:fld id="{5D2A64DE-480B-420F-9649-4F8E696E08E0}" type="datetime1">
               <a:rPr lang="en-US" smtClean="0"/>
-              <a:t>9/8/2024</a:t>
+              <a:t>9/16/2024</a:t>
             </a:fld>
             <a:endParaRPr lang="en-US"/>
           </a:p>
@@ -10182,7 +10193,7 @@
           <a:p>
             <a:fld id="{EA476A42-A091-4468-A075-64A31BE59948}" type="datetime1">
               <a:rPr lang="en-US" smtClean="0"/>
-              <a:t>9/8/2024</a:t>
+              <a:t>9/16/2024</a:t>
             </a:fld>
             <a:endParaRPr lang="en-US"/>
           </a:p>
@@ -10380,7 +10391,7 @@
           <a:p>
             <a:fld id="{0D3616D0-8311-4107-9726-6B805E7D05BA}" type="datetime1">
               <a:rPr lang="en-US" smtClean="0"/>
-              <a:t>9/8/2024</a:t>
+              <a:t>9/16/2024</a:t>
             </a:fld>
             <a:endParaRPr lang="en-US"/>
           </a:p>
@@ -10588,7 +10599,7 @@
           <a:p>
             <a:fld id="{3BC2557A-5C88-417A-A763-5AC779462A5F}" type="datetime1">
               <a:rPr lang="en-US" smtClean="0"/>
-              <a:t>9/8/2024</a:t>
+              <a:t>9/16/2024</a:t>
             </a:fld>
             <a:endParaRPr lang="en-US"/>
           </a:p>
@@ -11112,7 +11123,7 @@
           <a:p>
             <a:fld id="{07C7BFD4-467E-4EDE-93EA-052F5B39A4E5}" type="datetime1">
               <a:rPr lang="en-US" smtClean="0"/>
-              <a:t>9/8/2024</a:t>
+              <a:t>9/16/2024</a:t>
             </a:fld>
             <a:endParaRPr lang="en-US"/>
           </a:p>
@@ -11362,7 +11373,7 @@
           <a:p>
             <a:fld id="{07C7BFD4-467E-4EDE-93EA-052F5B39A4E5}" type="datetime1">
               <a:rPr lang="en-US" smtClean="0"/>
-              <a:t>9/8/2024</a:t>
+              <a:t>9/16/2024</a:t>
             </a:fld>
             <a:endParaRPr lang="en-US"/>
           </a:p>
@@ -11550,7 +11561,7 @@
           <a:p>
             <a:fld id="{109E55A0-C911-4F03-82FC-7E5926047D46}" type="datetime1">
               <a:rPr lang="en-US" smtClean="0"/>
-              <a:t>9/8/2024</a:t>
+              <a:t>9/16/2024</a:t>
             </a:fld>
             <a:endParaRPr lang="en-US"/>
           </a:p>
@@ -11863,7 +11874,7 @@
           <a:p>
             <a:fld id="{A533CBE2-D5BE-47AC-ADC2-9CDFC1D0CF90}" type="datetime1">
               <a:rPr lang="en-US" smtClean="0"/>
-              <a:t>9/8/2024</a:t>
+              <a:t>9/16/2024</a:t>
             </a:fld>
             <a:endParaRPr lang="en-US"/>
           </a:p>
@@ -12164,7 +12175,7 @@
           <a:p>
             <a:fld id="{39B7EDB1-CE74-4951-85A2-0B01C2128E28}" type="datetime1">
               <a:rPr lang="en-US" smtClean="0"/>
-              <a:t>9/8/2024</a:t>
+              <a:t>9/16/2024</a:t>
             </a:fld>
             <a:endParaRPr lang="en-US"/>
           </a:p>
@@ -12612,7 +12623,7 @@
           <a:p>
             <a:fld id="{2BC7EB92-A5C2-4807-A9DC-9EDE6CBFB241}" type="datetime1">
               <a:rPr lang="en-US" smtClean="0"/>
-              <a:t>9/8/2024</a:t>
+              <a:t>9/16/2024</a:t>
             </a:fld>
             <a:endParaRPr lang="en-US"/>
           </a:p>
@@ -12725,7 +12736,7 @@
           <a:p>
             <a:fld id="{2B7B7EE0-7771-4CD5-9B2B-3550753A54A1}" type="datetime1">
               <a:rPr lang="en-US" smtClean="0"/>
-              <a:t>9/8/2024</a:t>
+              <a:t>9/16/2024</a:t>
             </a:fld>
             <a:endParaRPr lang="en-US"/>
           </a:p>
@@ -13036,7 +13047,7 @@
           <a:p>
             <a:fld id="{F8B318B3-0E87-4416-A9B8-D891968C2727}" type="datetime1">
               <a:rPr lang="en-US" smtClean="0"/>
-              <a:t>9/8/2024</a:t>
+              <a:t>9/16/2024</a:t>
             </a:fld>
             <a:endParaRPr lang="en-US"/>
           </a:p>
@@ -13277,7 +13288,7 @@
           <a:p>
             <a:fld id="{54D997E8-DDEE-43F1-8D9B-F8A1E11DE488}" type="datetime1">
               <a:rPr lang="en-US" smtClean="0"/>
-              <a:t>9/8/2024</a:t>
+              <a:t>9/16/2024</a:t>
             </a:fld>
             <a:endParaRPr lang="en-US"/>
           </a:p>
@@ -16544,7 +16555,7 @@
         </p:nvSpPr>
         <p:spPr>
           <a:xfrm>
-            <a:off x="5859383" y="2578238"/>
+            <a:off x="5921729" y="2133600"/>
             <a:ext cx="6945627" cy="3416320"/>
           </a:xfrm>
           <a:prstGeom prst="rect">
@@ -43552,138 +43563,6 @@
                 </a:solidFill>
               </a:rPr>
               <a:t>yourself?</a:t>
-            </a:r>
-          </a:p>
-        </p:txBody>
-      </p:sp>
-      <p:sp>
-        <p:nvSpPr>
-          <p:cNvPr id="9" name="TextBox 8">
-            <a:extLst>
-              <a:ext uri="{FF2B5EF4-FFF2-40B4-BE49-F238E27FC236}">
-                <a16:creationId xmlns:a16="http://schemas.microsoft.com/office/drawing/2014/main" id="{97C0F401-1AD0-801D-2BDE-B6B314F9E537}"/>
-              </a:ext>
-            </a:extLst>
-          </p:cNvPr>
-          <p:cNvSpPr txBox="1"/>
-          <p:nvPr/>
-        </p:nvSpPr>
-        <p:spPr>
-          <a:xfrm>
-            <a:off x="3048000" y="2274838"/>
-            <a:ext cx="6096000" cy="2308324"/>
-          </a:xfrm>
-          <a:prstGeom prst="rect">
-            <a:avLst/>
-          </a:prstGeom>
-          <a:noFill/>
-          <a:ln w="12700" cap="flat" cmpd="sng" algn="ctr">
-            <a:noFill/>
-            <a:prstDash val="solid"/>
-            <a:miter lim="800000"/>
-          </a:ln>
-          <a:effectLst/>
-        </p:spPr>
-        <p:style>
-          <a:lnRef idx="2">
-            <a:schemeClr val="accent1">
-              <a:shade val="50000"/>
-            </a:schemeClr>
-          </a:lnRef>
-          <a:fillRef idx="1">
-            <a:schemeClr val="accent1"/>
-          </a:fillRef>
-          <a:effectRef idx="0">
-            <a:schemeClr val="accent1"/>
-          </a:effectRef>
-          <a:fontRef idx="minor">
-            <a:schemeClr val="lt1"/>
-          </a:fontRef>
-        </p:style>
-        <p:txBody>
-          <a:bodyPr wrap="square">
-            <a:spAutoFit/>
-          </a:bodyPr>
-          <a:lstStyle/>
-          <a:p>
-            <a:r>
-              <a:rPr lang="en-US" dirty="0"/>
-              <a:t>By the end of this lesson, you should be able to</a:t>
-            </a:r>
-          </a:p>
-          <a:p>
-            <a:pPr lvl="1"/>
-            <a:r>
-              <a:rPr lang="en-US" dirty="0">
-                <a:solidFill>
-                  <a:srgbClr val="24292F"/>
-                </a:solidFill>
-              </a:rPr>
-              <a:t>Explain how </a:t>
-            </a:r>
-            <a:r>
-              <a:rPr lang="en-US" b="0" i="0" dirty="0">
-                <a:solidFill>
-                  <a:srgbClr val="24292F"/>
-                </a:solidFill>
-                <a:effectLst/>
-              </a:rPr>
-              <a:t>patterns capture common solutions and tradeoffs for recurring problems.</a:t>
-            </a:r>
-          </a:p>
-          <a:p>
-            <a:pPr lvl="1"/>
-            <a:r>
-              <a:rPr lang="en-US" dirty="0">
-                <a:solidFill>
-                  <a:srgbClr val="24292F"/>
-                </a:solidFill>
-              </a:rPr>
-              <a:t>Explain and give an example of each of the following:</a:t>
-            </a:r>
-          </a:p>
-          <a:p>
-            <a:pPr lvl="2"/>
-            <a:r>
-              <a:rPr lang="en-US" dirty="0">
-                <a:solidFill>
-                  <a:srgbClr val="24292F"/>
-                </a:solidFill>
-              </a:rPr>
-              <a:t>The Listener pattern</a:t>
-            </a:r>
-          </a:p>
-          <a:p>
-            <a:pPr lvl="2"/>
-            <a:r>
-              <a:rPr lang="en-US" dirty="0">
-                <a:solidFill>
-                  <a:srgbClr val="24292F"/>
-                </a:solidFill>
-              </a:rPr>
-              <a:t>The Typed-Emitter pattern</a:t>
-            </a:r>
-          </a:p>
-          <a:p>
-            <a:pPr lvl="2"/>
-            <a:r>
-              <a:rPr lang="en-US" dirty="0">
-                <a:solidFill>
-                  <a:srgbClr val="24292F"/>
-                </a:solidFill>
-              </a:rPr>
-              <a:t>The Handler-Passing pattern</a:t>
-            </a:r>
-          </a:p>
-          <a:p>
-            <a:pPr lvl="2"/>
-            <a:r>
-              <a:rPr lang="en-US" dirty="0">
-                <a:solidFill>
-                  <a:srgbClr val="24292F"/>
-                </a:solidFill>
-              </a:rPr>
-              <a:t>The Singleton pattern</a:t>
             </a:r>
           </a:p>
         </p:txBody>

</xml_diff>